<commit_message>
Update The Kalamazoo Route Planner Project Presentation_2.5.pptx
</commit_message>
<xml_diff>
--- a/paperwork/presentation/The Kalamazoo Route Planner Project Presentation_2.5.pptx
+++ b/paperwork/presentation/The Kalamazoo Route Planner Project Presentation_2.5.pptx
@@ -144,7 +144,7 @@
 <file path=ppt/revisionInfo.xml><?xml version="1.0" encoding="utf-8"?>
 <p1510:revInfo xmlns:a="http://schemas.openxmlformats.org/drawingml/2006/main" xmlns:r="http://schemas.openxmlformats.org/officeDocument/2006/relationships" xmlns:p1510="http://schemas.microsoft.com/office/powerpoint/2015/10/main">
   <p1510:revLst>
-    <p1510:client id="{8F711590-78BC-4BA5-BC0B-543076D2BAB6}" v="326" dt="2023-03-31T23:06:20.871"/>
+    <p1510:client id="{8F711590-78BC-4BA5-BC0B-543076D2BAB6}" v="454" dt="2023-03-31T23:17:01.398"/>
     <p1510:client id="{A6721134-81B6-40CA-9BF2-F9EF39981F27}" v="30" dt="2023-03-31T23:01:48.764"/>
   </p1510:revLst>
 </p1510:revInfo>
@@ -325,7 +325,7 @@
   <pc:docChgLst>
     <pc:chgData name="matthew phillips" userId="7a28054db87882b8" providerId="Windows Live" clId="Web-{8F711590-78BC-4BA5-BC0B-543076D2BAB6}"/>
     <pc:docChg chg="addSld delSld modSld sldOrd">
-      <pc:chgData name="matthew phillips" userId="7a28054db87882b8" providerId="Windows Live" clId="Web-{8F711590-78BC-4BA5-BC0B-543076D2BAB6}" dt="2023-03-31T23:06:20.871" v="319" actId="14100"/>
+      <pc:chgData name="matthew phillips" userId="7a28054db87882b8" providerId="Windows Live" clId="Web-{8F711590-78BC-4BA5-BC0B-543076D2BAB6}" dt="2023-03-31T23:16:55.914" v="444" actId="20577"/>
       <pc:docMkLst>
         <pc:docMk/>
       </pc:docMkLst>
@@ -468,6 +468,85 @@
           <pc:docMk/>
           <pc:sldMk cId="2768714317" sldId="267"/>
         </pc:sldMkLst>
+      </pc:sldChg>
+      <pc:sldChg chg="addSp delSp modSp">
+        <pc:chgData name="matthew phillips" userId="7a28054db87882b8" providerId="Windows Live" clId="Web-{8F711590-78BC-4BA5-BC0B-543076D2BAB6}" dt="2023-03-31T23:16:55.914" v="444" actId="20577"/>
+        <pc:sldMkLst>
+          <pc:docMk/>
+          <pc:sldMk cId="1356265510" sldId="268"/>
+        </pc:sldMkLst>
+        <pc:spChg chg="mod">
+          <ac:chgData name="matthew phillips" userId="7a28054db87882b8" providerId="Windows Live" clId="Web-{8F711590-78BC-4BA5-BC0B-543076D2BAB6}" dt="2023-03-31T23:16:55.914" v="444" actId="20577"/>
+          <ac:spMkLst>
+            <pc:docMk/>
+            <pc:sldMk cId="1356265510" sldId="268"/>
+            <ac:spMk id="2" creationId="{E893191B-DE8F-E624-0577-45EDF1B73126}"/>
+          </ac:spMkLst>
+        </pc:spChg>
+        <pc:spChg chg="add del">
+          <ac:chgData name="matthew phillips" userId="7a28054db87882b8" providerId="Windows Live" clId="Web-{8F711590-78BC-4BA5-BC0B-543076D2BAB6}" dt="2023-03-31T23:09:21.359" v="324"/>
+          <ac:spMkLst>
+            <pc:docMk/>
+            <pc:sldMk cId="1356265510" sldId="268"/>
+            <ac:spMk id="3" creationId="{347B563E-AD87-8E0F-F02F-78B4153F310D}"/>
+          </ac:spMkLst>
+        </pc:spChg>
+        <pc:spChg chg="add del mod">
+          <ac:chgData name="matthew phillips" userId="7a28054db87882b8" providerId="Windows Live" clId="Web-{8F711590-78BC-4BA5-BC0B-543076D2BAB6}" dt="2023-03-31T23:08:05.217" v="322"/>
+          <ac:spMkLst>
+            <pc:docMk/>
+            <pc:sldMk cId="1356265510" sldId="268"/>
+            <ac:spMk id="6" creationId="{A5188D2A-6729-CDF4-6BF4-13A13A656431}"/>
+          </ac:spMkLst>
+        </pc:spChg>
+        <pc:picChg chg="add del mod ord">
+          <ac:chgData name="matthew phillips" userId="7a28054db87882b8" providerId="Windows Live" clId="Web-{8F711590-78BC-4BA5-BC0B-543076D2BAB6}" dt="2023-03-31T23:08:09.749" v="323"/>
+          <ac:picMkLst>
+            <pc:docMk/>
+            <pc:sldMk cId="1356265510" sldId="268"/>
+            <ac:picMk id="4" creationId="{6C288009-3406-1BF4-B5E6-EE83089A23BA}"/>
+          </ac:picMkLst>
+        </pc:picChg>
+        <pc:picChg chg="add mod ord">
+          <ac:chgData name="matthew phillips" userId="7a28054db87882b8" providerId="Windows Live" clId="Web-{8F711590-78BC-4BA5-BC0B-543076D2BAB6}" dt="2023-03-31T23:10:07.953" v="363" actId="1076"/>
+          <ac:picMkLst>
+            <pc:docMk/>
+            <pc:sldMk cId="1356265510" sldId="268"/>
+            <ac:picMk id="7" creationId="{248F7E1A-898F-00BC-A155-5BE660EF6FA1}"/>
+          </ac:picMkLst>
+        </pc:picChg>
+        <pc:picChg chg="add mod">
+          <ac:chgData name="matthew phillips" userId="7a28054db87882b8" providerId="Windows Live" clId="Web-{8F711590-78BC-4BA5-BC0B-543076D2BAB6}" dt="2023-03-31T23:11:13.064" v="368" actId="1076"/>
+          <ac:picMkLst>
+            <pc:docMk/>
+            <pc:sldMk cId="1356265510" sldId="268"/>
+            <ac:picMk id="8" creationId="{7DFAFC0E-16F4-6BD1-D747-9F58C876044D}"/>
+          </ac:picMkLst>
+        </pc:picChg>
+        <pc:picChg chg="add del mod">
+          <ac:chgData name="matthew phillips" userId="7a28054db87882b8" providerId="Windows Live" clId="Web-{8F711590-78BC-4BA5-BC0B-543076D2BAB6}" dt="2023-03-31T23:12:59.066" v="370"/>
+          <ac:picMkLst>
+            <pc:docMk/>
+            <pc:sldMk cId="1356265510" sldId="268"/>
+            <ac:picMk id="9" creationId="{6AE8DC74-5614-1B5F-EA37-71D4DD2A9E87}"/>
+          </ac:picMkLst>
+        </pc:picChg>
+        <pc:picChg chg="add del mod">
+          <ac:chgData name="matthew phillips" userId="7a28054db87882b8" providerId="Windows Live" clId="Web-{8F711590-78BC-4BA5-BC0B-543076D2BAB6}" dt="2023-03-31T23:13:32.769" v="372"/>
+          <ac:picMkLst>
+            <pc:docMk/>
+            <pc:sldMk cId="1356265510" sldId="268"/>
+            <ac:picMk id="10" creationId="{EB79067C-4D14-5499-93DE-14705FD8A817}"/>
+          </ac:picMkLst>
+        </pc:picChg>
+        <pc:picChg chg="add mod">
+          <ac:chgData name="matthew phillips" userId="7a28054db87882b8" providerId="Windows Live" clId="Web-{8F711590-78BC-4BA5-BC0B-543076D2BAB6}" dt="2023-03-31T23:14:52.615" v="377" actId="14100"/>
+          <ac:picMkLst>
+            <pc:docMk/>
+            <pc:sldMk cId="1356265510" sldId="268"/>
+            <ac:picMk id="11" creationId="{2AA2459B-3D6D-E07A-9818-E48541C8B685}"/>
+          </ac:picMkLst>
+        </pc:picChg>
       </pc:sldChg>
       <pc:sldChg chg="del">
         <pc:chgData name="matthew phillips" userId="7a28054db87882b8" providerId="Windows Live" clId="Web-{8F711590-78BC-4BA5-BC0B-543076D2BAB6}" dt="2023-03-31T22:46:36.100" v="277"/>
@@ -9791,40 +9870,114 @@
             <p:ph type="title"/>
           </p:nvPr>
         </p:nvSpPr>
-        <p:spPr/>
-        <p:txBody>
-          <a:bodyPr/>
-          <a:lstStyle/>
-          <a:p>
-            <a:endParaRPr lang="en-US"/>
-          </a:p>
-        </p:txBody>
-      </p:sp>
-      <p:sp>
-        <p:nvSpPr>
-          <p:cNvPr id="3" name="Content Placeholder 2">
+        <p:spPr>
+          <a:xfrm>
+            <a:off x="1822833" y="283194"/>
+            <a:ext cx="8534400" cy="1507067"/>
+          </a:xfrm>
+        </p:spPr>
+        <p:txBody>
+          <a:bodyPr vert="horz" lIns="91440" tIns="45720" rIns="91440" bIns="45720" rtlCol="0" anchor="ctr">
+            <a:noAutofit/>
+          </a:bodyPr>
+          <a:lstStyle/>
+          <a:p>
+            <a:r>
+              <a:rPr lang="en-US" sz="2400"/>
+              <a:t>Users can place nodes and A line will be drawn between the nodes. By clicking on the map Nodes can be added and removed by clicking on them.</a:t>
+            </a:r>
+          </a:p>
+        </p:txBody>
+      </p:sp>
+      <p:pic>
+        <p:nvPicPr>
+          <p:cNvPr id="7" name="Picture 7" descr="A picture containing timeline&#10;&#10;Description automatically generated">
             <a:extLst>
               <a:ext uri="{FF2B5EF4-FFF2-40B4-BE49-F238E27FC236}">
-                <a16:creationId xmlns:a16="http://schemas.microsoft.com/office/drawing/2014/main" id="{347B563E-AD87-8E0F-F02F-78B4153F310D}"/>
+                <a16:creationId xmlns:a16="http://schemas.microsoft.com/office/drawing/2014/main" id="{248F7E1A-898F-00BC-A155-5BE660EF6FA1}"/>
               </a:ext>
             </a:extLst>
           </p:cNvPr>
-          <p:cNvSpPr>
-            <a:spLocks noGrp="1"/>
-          </p:cNvSpPr>
+          <p:cNvPicPr>
+            <a:picLocks noGrp="1" noChangeAspect="1"/>
+          </p:cNvPicPr>
           <p:nvPr>
             <p:ph idx="1"/>
           </p:nvPr>
-        </p:nvSpPr>
-        <p:spPr/>
-        <p:txBody>
-          <a:bodyPr/>
-          <a:lstStyle/>
-          <a:p>
-            <a:endParaRPr lang="en-US"/>
-          </a:p>
-        </p:txBody>
-      </p:sp>
+        </p:nvPicPr>
+        <p:blipFill>
+          <a:blip r:embed="rId2"/>
+          <a:stretch>
+            <a:fillRect/>
+          </a:stretch>
+        </p:blipFill>
+        <p:spPr>
+          <a:xfrm>
+            <a:off x="783448" y="2516351"/>
+            <a:ext cx="3036964" cy="3045957"/>
+          </a:xfrm>
+        </p:spPr>
+      </p:pic>
+      <p:pic>
+        <p:nvPicPr>
+          <p:cNvPr id="8" name="Picture 8">
+            <a:extLst>
+              <a:ext uri="{FF2B5EF4-FFF2-40B4-BE49-F238E27FC236}">
+                <a16:creationId xmlns:a16="http://schemas.microsoft.com/office/drawing/2014/main" id="{7DFAFC0E-16F4-6BD1-D747-9F58C876044D}"/>
+              </a:ext>
+            </a:extLst>
+          </p:cNvPr>
+          <p:cNvPicPr>
+            <a:picLocks noChangeAspect="1"/>
+          </p:cNvPicPr>
+          <p:nvPr/>
+        </p:nvPicPr>
+        <p:blipFill>
+          <a:blip r:embed="rId3"/>
+          <a:stretch>
+            <a:fillRect/>
+          </a:stretch>
+        </p:blipFill>
+        <p:spPr>
+          <a:xfrm>
+            <a:off x="8332952" y="2518188"/>
+            <a:ext cx="3032234" cy="3056591"/>
+          </a:xfrm>
+          <a:prstGeom prst="rect">
+            <a:avLst/>
+          </a:prstGeom>
+        </p:spPr>
+      </p:pic>
+      <p:pic>
+        <p:nvPicPr>
+          <p:cNvPr id="11" name="Picture 11">
+            <a:extLst>
+              <a:ext uri="{FF2B5EF4-FFF2-40B4-BE49-F238E27FC236}">
+                <a16:creationId xmlns:a16="http://schemas.microsoft.com/office/drawing/2014/main" id="{2AA2459B-3D6D-E07A-9818-E48541C8B685}"/>
+              </a:ext>
+            </a:extLst>
+          </p:cNvPr>
+          <p:cNvPicPr>
+            <a:picLocks noChangeAspect="1"/>
+          </p:cNvPicPr>
+          <p:nvPr/>
+        </p:nvPicPr>
+        <p:blipFill>
+          <a:blip r:embed="rId4"/>
+          <a:stretch>
+            <a:fillRect/>
+          </a:stretch>
+        </p:blipFill>
+        <p:spPr>
+          <a:xfrm>
+            <a:off x="4575504" y="2518187"/>
+            <a:ext cx="3032234" cy="3056592"/>
+          </a:xfrm>
+          <a:prstGeom prst="rect">
+            <a:avLst/>
+          </a:prstGeom>
+        </p:spPr>
+      </p:pic>
     </p:spTree>
     <p:extLst>
       <p:ext uri="{BB962C8B-B14F-4D97-AF65-F5344CB8AC3E}">

</xml_diff>